<commit_message>
add standard deviation tables
</commit_message>
<xml_diff>
--- a/presentations/biomass_ej_briefing.pptx
+++ b/presentations/biomass_ej_briefing.pptx
@@ -11,7 +11,7 @@
     <p:sldId id="262" r:id="rId5"/>
     <p:sldId id="263" r:id="rId6"/>
     <p:sldId id="264" r:id="rId7"/>
-    <p:sldId id="260" r:id="rId8"/>
+    <p:sldId id="265" r:id="rId8"/>
   </p:sldIdLst>
   <p:sldSz cx="12192000" cy="6858000"/>
   <p:notesSz cx="6858000" cy="9144000"/>
@@ -270,7 +270,7 @@
           <a:p>
             <a:fld id="{8E16BF56-5776-9043-9A47-E5AFC0EB042F}" type="datetimeFigureOut">
               <a:rPr lang="en-US" smtClean="0"/>
-              <a:t>3/25/2024</a:t>
+              <a:t>3/29/2024</a:t>
             </a:fld>
             <a:endParaRPr lang="en-US"/>
           </a:p>
@@ -498,7 +498,7 @@
           <a:p>
             <a:fld id="{8E16BF56-5776-9043-9A47-E5AFC0EB042F}" type="datetimeFigureOut">
               <a:rPr lang="en-US" smtClean="0"/>
-              <a:t>3/25/2024</a:t>
+              <a:t>3/29/2024</a:t>
             </a:fld>
             <a:endParaRPr lang="en-US"/>
           </a:p>
@@ -773,7 +773,7 @@
           <a:p>
             <a:fld id="{8E16BF56-5776-9043-9A47-E5AFC0EB042F}" type="datetimeFigureOut">
               <a:rPr lang="en-US" smtClean="0"/>
-              <a:t>3/25/2024</a:t>
+              <a:t>3/29/2024</a:t>
             </a:fld>
             <a:endParaRPr lang="en-US"/>
           </a:p>
@@ -1038,7 +1038,7 @@
           <a:p>
             <a:fld id="{8E16BF56-5776-9043-9A47-E5AFC0EB042F}" type="datetimeFigureOut">
               <a:rPr lang="en-US" smtClean="0"/>
-              <a:t>3/25/2024</a:t>
+              <a:t>3/29/2024</a:t>
             </a:fld>
             <a:endParaRPr lang="en-US"/>
           </a:p>
@@ -1450,7 +1450,7 @@
           <a:p>
             <a:fld id="{8E16BF56-5776-9043-9A47-E5AFC0EB042F}" type="datetimeFigureOut">
               <a:rPr lang="en-US" smtClean="0"/>
-              <a:t>3/25/2024</a:t>
+              <a:t>3/29/2024</a:t>
             </a:fld>
             <a:endParaRPr lang="en-US"/>
           </a:p>
@@ -1591,7 +1591,7 @@
           <a:p>
             <a:fld id="{8E16BF56-5776-9043-9A47-E5AFC0EB042F}" type="datetimeFigureOut">
               <a:rPr lang="en-US" smtClean="0"/>
-              <a:t>3/25/2024</a:t>
+              <a:t>3/29/2024</a:t>
             </a:fld>
             <a:endParaRPr lang="en-US"/>
           </a:p>
@@ -1704,7 +1704,7 @@
           <a:p>
             <a:fld id="{8E16BF56-5776-9043-9A47-E5AFC0EB042F}" type="datetimeFigureOut">
               <a:rPr lang="en-US" smtClean="0"/>
-              <a:t>3/25/2024</a:t>
+              <a:t>3/29/2024</a:t>
             </a:fld>
             <a:endParaRPr lang="en-US"/>
           </a:p>
@@ -2144,7 +2144,7 @@
           <a:p>
             <a:fld id="{8E16BF56-5776-9043-9A47-E5AFC0EB042F}" type="datetimeFigureOut">
               <a:rPr lang="en-US" smtClean="0"/>
-              <a:t>3/25/2024</a:t>
+              <a:t>3/29/2024</a:t>
             </a:fld>
             <a:endParaRPr lang="en-US"/>
           </a:p>
@@ -2631,33 +2631,405 @@
           <a:p>
             <a:r>
               <a:rPr lang="en-US" dirty="0"/>
-              <a:t>Background</a:t>
-            </a:r>
-          </a:p>
-        </p:txBody>
-      </p:sp>
-      <p:sp>
-        <p:nvSpPr>
-          <p:cNvPr id="3" name="Content Placeholder 2">
-            <a:extLst>
-              <a:ext uri="{FF2B5EF4-FFF2-40B4-BE49-F238E27FC236}">
-                <a16:creationId xmlns:a16="http://schemas.microsoft.com/office/drawing/2014/main" id="{D38A32B8-9115-9E6B-DE2F-3ECE4F32CB68}"/>
-              </a:ext>
-            </a:extLst>
-          </p:cNvPr>
-          <p:cNvSpPr>
-            <a:spLocks noGrp="1"/>
-          </p:cNvSpPr>
-          <p:nvPr>
-            <p:ph idx="1"/>
-          </p:nvPr>
-        </p:nvSpPr>
-        <p:spPr/>
-        <p:txBody>
-          <a:bodyPr/>
-          <a:lstStyle/>
-          <a:p>
-            <a:endParaRPr lang="en-US"/>
+              <a:t>Background &amp; Context</a:t>
+            </a:r>
+          </a:p>
+        </p:txBody>
+      </p:sp>
+      <p:sp>
+        <p:nvSpPr>
+          <p:cNvPr id="4" name="Content Placeholder 2">
+            <a:extLst>
+              <a:ext uri="{FF2B5EF4-FFF2-40B4-BE49-F238E27FC236}">
+                <a16:creationId xmlns:a16="http://schemas.microsoft.com/office/drawing/2014/main" id="{4277762B-C83B-8461-B81F-3095D05D8614}"/>
+              </a:ext>
+            </a:extLst>
+          </p:cNvPr>
+          <p:cNvSpPr>
+            <a:spLocks noGrp="1"/>
+          </p:cNvSpPr>
+          <p:nvPr/>
+        </p:nvSpPr>
+        <p:spPr>
+          <a:xfrm>
+            <a:off x="1806210" y="1882896"/>
+            <a:ext cx="9756531" cy="2441575"/>
+          </a:xfrm>
+          <a:prstGeom prst="rect">
+            <a:avLst/>
+          </a:prstGeom>
+        </p:spPr>
+        <p:txBody>
+          <a:bodyPr vert="horz" lIns="91440" tIns="45720" rIns="91440" bIns="45720" rtlCol="0">
+            <a:normAutofit fontScale="85000" lnSpcReduction="20000"/>
+          </a:bodyPr>
+          <a:lstStyle>
+            <a:lvl1pPr marL="228600" indent="-228600" algn="l" defTabSz="914400" rtl="0" eaLnBrk="1" latinLnBrk="0" hangingPunct="1">
+              <a:lnSpc>
+                <a:spcPct val="90000"/>
+              </a:lnSpc>
+              <a:spcBef>
+                <a:spcPts val="1000"/>
+              </a:spcBef>
+              <a:buFont typeface="Arial" panose="020B0604020202020204" pitchFamily="34" charset="0"/>
+              <a:buChar char="•"/>
+              <a:defRPr sz="2800" kern="1200">
+                <a:solidFill>
+                  <a:schemeClr val="tx1"/>
+                </a:solidFill>
+                <a:latin typeface="+mn-lt"/>
+                <a:ea typeface="+mn-ea"/>
+                <a:cs typeface="+mn-cs"/>
+              </a:defRPr>
+            </a:lvl1pPr>
+            <a:lvl2pPr marL="685800" indent="-228600" algn="l" defTabSz="914400" rtl="0" eaLnBrk="1" latinLnBrk="0" hangingPunct="1">
+              <a:lnSpc>
+                <a:spcPct val="90000"/>
+              </a:lnSpc>
+              <a:spcBef>
+                <a:spcPts val="500"/>
+              </a:spcBef>
+              <a:buFont typeface="Arial" panose="020B0604020202020204" pitchFamily="34" charset="0"/>
+              <a:buChar char="•"/>
+              <a:defRPr sz="2400" kern="1200">
+                <a:solidFill>
+                  <a:schemeClr val="tx1"/>
+                </a:solidFill>
+                <a:latin typeface="+mn-lt"/>
+                <a:ea typeface="+mn-ea"/>
+                <a:cs typeface="+mn-cs"/>
+              </a:defRPr>
+            </a:lvl2pPr>
+            <a:lvl3pPr marL="1143000" indent="-228600" algn="l" defTabSz="914400" rtl="0" eaLnBrk="1" latinLnBrk="0" hangingPunct="1">
+              <a:lnSpc>
+                <a:spcPct val="90000"/>
+              </a:lnSpc>
+              <a:spcBef>
+                <a:spcPts val="500"/>
+              </a:spcBef>
+              <a:buFont typeface="Arial" panose="020B0604020202020204" pitchFamily="34" charset="0"/>
+              <a:buChar char="•"/>
+              <a:defRPr sz="2000" kern="1200">
+                <a:solidFill>
+                  <a:schemeClr val="tx1"/>
+                </a:solidFill>
+                <a:latin typeface="+mn-lt"/>
+                <a:ea typeface="+mn-ea"/>
+                <a:cs typeface="+mn-cs"/>
+              </a:defRPr>
+            </a:lvl3pPr>
+            <a:lvl4pPr marL="1600200" indent="-228600" algn="l" defTabSz="914400" rtl="0" eaLnBrk="1" latinLnBrk="0" hangingPunct="1">
+              <a:lnSpc>
+                <a:spcPct val="90000"/>
+              </a:lnSpc>
+              <a:spcBef>
+                <a:spcPts val="500"/>
+              </a:spcBef>
+              <a:buFont typeface="Arial" panose="020B0604020202020204" pitchFamily="34" charset="0"/>
+              <a:buChar char="•"/>
+              <a:defRPr sz="1800" kern="1200">
+                <a:solidFill>
+                  <a:schemeClr val="tx1"/>
+                </a:solidFill>
+                <a:latin typeface="+mn-lt"/>
+                <a:ea typeface="+mn-ea"/>
+                <a:cs typeface="+mn-cs"/>
+              </a:defRPr>
+            </a:lvl4pPr>
+            <a:lvl5pPr marL="2057400" indent="-228600" algn="l" defTabSz="914400" rtl="0" eaLnBrk="1" latinLnBrk="0" hangingPunct="1">
+              <a:lnSpc>
+                <a:spcPct val="90000"/>
+              </a:lnSpc>
+              <a:spcBef>
+                <a:spcPts val="500"/>
+              </a:spcBef>
+              <a:buFont typeface="Arial" panose="020B0604020202020204" pitchFamily="34" charset="0"/>
+              <a:buChar char="•"/>
+              <a:defRPr sz="1800" kern="1200">
+                <a:solidFill>
+                  <a:schemeClr val="tx1"/>
+                </a:solidFill>
+                <a:latin typeface="+mn-lt"/>
+                <a:ea typeface="+mn-ea"/>
+                <a:cs typeface="+mn-cs"/>
+              </a:defRPr>
+            </a:lvl5pPr>
+            <a:lvl6pPr marL="2514600" indent="-228600" algn="l" defTabSz="914400" rtl="0" eaLnBrk="1" latinLnBrk="0" hangingPunct="1">
+              <a:lnSpc>
+                <a:spcPct val="90000"/>
+              </a:lnSpc>
+              <a:spcBef>
+                <a:spcPts val="500"/>
+              </a:spcBef>
+              <a:buFont typeface="Arial" panose="020B0604020202020204" pitchFamily="34" charset="0"/>
+              <a:buChar char="•"/>
+              <a:defRPr sz="1800" kern="1200">
+                <a:solidFill>
+                  <a:schemeClr val="tx1"/>
+                </a:solidFill>
+                <a:latin typeface="+mn-lt"/>
+                <a:ea typeface="+mn-ea"/>
+                <a:cs typeface="+mn-cs"/>
+              </a:defRPr>
+            </a:lvl6pPr>
+            <a:lvl7pPr marL="2971800" indent="-228600" algn="l" defTabSz="914400" rtl="0" eaLnBrk="1" latinLnBrk="0" hangingPunct="1">
+              <a:lnSpc>
+                <a:spcPct val="90000"/>
+              </a:lnSpc>
+              <a:spcBef>
+                <a:spcPts val="500"/>
+              </a:spcBef>
+              <a:buFont typeface="Arial" panose="020B0604020202020204" pitchFamily="34" charset="0"/>
+              <a:buChar char="•"/>
+              <a:defRPr sz="1800" kern="1200">
+                <a:solidFill>
+                  <a:schemeClr val="tx1"/>
+                </a:solidFill>
+                <a:latin typeface="+mn-lt"/>
+                <a:ea typeface="+mn-ea"/>
+                <a:cs typeface="+mn-cs"/>
+              </a:defRPr>
+            </a:lvl7pPr>
+            <a:lvl8pPr marL="3429000" indent="-228600" algn="l" defTabSz="914400" rtl="0" eaLnBrk="1" latinLnBrk="0" hangingPunct="1">
+              <a:lnSpc>
+                <a:spcPct val="90000"/>
+              </a:lnSpc>
+              <a:spcBef>
+                <a:spcPts val="500"/>
+              </a:spcBef>
+              <a:buFont typeface="Arial" panose="020B0604020202020204" pitchFamily="34" charset="0"/>
+              <a:buChar char="•"/>
+              <a:defRPr sz="1800" kern="1200">
+                <a:solidFill>
+                  <a:schemeClr val="tx1"/>
+                </a:solidFill>
+                <a:latin typeface="+mn-lt"/>
+                <a:ea typeface="+mn-ea"/>
+                <a:cs typeface="+mn-cs"/>
+              </a:defRPr>
+            </a:lvl8pPr>
+            <a:lvl9pPr marL="3886200" indent="-228600" algn="l" defTabSz="914400" rtl="0" eaLnBrk="1" latinLnBrk="0" hangingPunct="1">
+              <a:lnSpc>
+                <a:spcPct val="90000"/>
+              </a:lnSpc>
+              <a:spcBef>
+                <a:spcPts val="500"/>
+              </a:spcBef>
+              <a:buFont typeface="Arial" panose="020B0604020202020204" pitchFamily="34" charset="0"/>
+              <a:buChar char="•"/>
+              <a:defRPr sz="1800" kern="1200">
+                <a:solidFill>
+                  <a:schemeClr val="tx1"/>
+                </a:solidFill>
+                <a:latin typeface="+mn-lt"/>
+                <a:ea typeface="+mn-ea"/>
+                <a:cs typeface="+mn-cs"/>
+              </a:defRPr>
+            </a:lvl9pPr>
+          </a:lstStyle>
+          <a:p>
+            <a:r>
+              <a:rPr lang="en-US" dirty="0"/>
+              <a:t>CCD has worked closely with colleagues including OAQPS, ORD, Region 4 on issues like wood pellet production for over a decade</a:t>
+            </a:r>
+          </a:p>
+          <a:p>
+            <a:r>
+              <a:rPr lang="en-US" dirty="0"/>
+              <a:t>In August 2022, OAP held a listening session with the Dogwood Alliance, the People’s Justice Council and residents concerning environmental justice (EJ) issues surrounding pellet mills in the Southeast</a:t>
+            </a:r>
+          </a:p>
+          <a:p>
+            <a:r>
+              <a:rPr lang="en-US" dirty="0"/>
+              <a:t>Concerns focused on Title V permits for pellet mills, and the conditions documented in EJ reports submitted by the applicant and documented by CNN and others </a:t>
+            </a:r>
+          </a:p>
+        </p:txBody>
+      </p:sp>
+      <p:pic>
+        <p:nvPicPr>
+          <p:cNvPr id="1026" name="Picture 2">
+            <a:extLst>
+              <a:ext uri="{FF2B5EF4-FFF2-40B4-BE49-F238E27FC236}">
+                <a16:creationId xmlns:a16="http://schemas.microsoft.com/office/drawing/2014/main" id="{56E610EF-613C-E835-7CE3-01A69354C640}"/>
+              </a:ext>
+            </a:extLst>
+          </p:cNvPr>
+          <p:cNvPicPr>
+            <a:picLocks noChangeAspect="1" noChangeArrowheads="1"/>
+          </p:cNvPicPr>
+          <p:nvPr/>
+        </p:nvPicPr>
+        <p:blipFill>
+          <a:blip r:embed="rId2">
+            <a:extLst>
+              <a:ext uri="{28A0092B-C50C-407E-A947-70E740481C1C}">
+                <a14:useLocalDpi xmlns:a14="http://schemas.microsoft.com/office/drawing/2010/main" val="0"/>
+              </a:ext>
+            </a:extLst>
+          </a:blip>
+          <a:srcRect/>
+          <a:stretch>
+            <a:fillRect/>
+          </a:stretch>
+        </p:blipFill>
+        <p:spPr bwMode="auto">
+          <a:xfrm>
+            <a:off x="2077915" y="4324471"/>
+            <a:ext cx="8915400" cy="1800225"/>
+          </a:xfrm>
+          <a:prstGeom prst="rect">
+            <a:avLst/>
+          </a:prstGeom>
+          <a:noFill/>
+          <a:extLst>
+            <a:ext uri="{909E8E84-426E-40DD-AFC4-6F175D3DCCD1}">
+              <a14:hiddenFill xmlns:a14="http://schemas.microsoft.com/office/drawing/2010/main">
+                <a:solidFill>
+                  <a:srgbClr val="FFFFFF"/>
+                </a:solidFill>
+              </a14:hiddenFill>
+            </a:ext>
+          </a:extLst>
+        </p:spPr>
+      </p:pic>
+      <p:sp>
+        <p:nvSpPr>
+          <p:cNvPr id="5" name="TextBox 5">
+            <a:extLst>
+              <a:ext uri="{FF2B5EF4-FFF2-40B4-BE49-F238E27FC236}">
+                <a16:creationId xmlns:a16="http://schemas.microsoft.com/office/drawing/2014/main" id="{8677251A-7AB6-B3C4-8ED1-7790D22A0C6C}"/>
+              </a:ext>
+            </a:extLst>
+          </p:cNvPr>
+          <p:cNvSpPr txBox="1"/>
+          <p:nvPr/>
+        </p:nvSpPr>
+        <p:spPr>
+          <a:xfrm>
+            <a:off x="2734230" y="5986196"/>
+            <a:ext cx="7379855" cy="276999"/>
+          </a:xfrm>
+          <a:prstGeom prst="rect">
+            <a:avLst/>
+          </a:prstGeom>
+          <a:noFill/>
+        </p:spPr>
+        <p:txBody>
+          <a:bodyPr wrap="square" rtlCol="0">
+            <a:spAutoFit/>
+          </a:bodyPr>
+          <a:lstStyle>
+            <a:defPPr>
+              <a:defRPr lang="en-US"/>
+            </a:defPPr>
+            <a:lvl1pPr marL="0" algn="l" defTabSz="914400" rtl="0" eaLnBrk="1" latinLnBrk="0" hangingPunct="1">
+              <a:defRPr sz="1800" kern="1200">
+                <a:solidFill>
+                  <a:schemeClr val="tx1"/>
+                </a:solidFill>
+                <a:latin typeface="+mn-lt"/>
+                <a:ea typeface="+mn-ea"/>
+                <a:cs typeface="+mn-cs"/>
+              </a:defRPr>
+            </a:lvl1pPr>
+            <a:lvl2pPr marL="457200" algn="l" defTabSz="914400" rtl="0" eaLnBrk="1" latinLnBrk="0" hangingPunct="1">
+              <a:defRPr sz="1800" kern="1200">
+                <a:solidFill>
+                  <a:schemeClr val="tx1"/>
+                </a:solidFill>
+                <a:latin typeface="+mn-lt"/>
+                <a:ea typeface="+mn-ea"/>
+                <a:cs typeface="+mn-cs"/>
+              </a:defRPr>
+            </a:lvl2pPr>
+            <a:lvl3pPr marL="914400" algn="l" defTabSz="914400" rtl="0" eaLnBrk="1" latinLnBrk="0" hangingPunct="1">
+              <a:defRPr sz="1800" kern="1200">
+                <a:solidFill>
+                  <a:schemeClr val="tx1"/>
+                </a:solidFill>
+                <a:latin typeface="+mn-lt"/>
+                <a:ea typeface="+mn-ea"/>
+                <a:cs typeface="+mn-cs"/>
+              </a:defRPr>
+            </a:lvl3pPr>
+            <a:lvl4pPr marL="1371600" algn="l" defTabSz="914400" rtl="0" eaLnBrk="1" latinLnBrk="0" hangingPunct="1">
+              <a:defRPr sz="1800" kern="1200">
+                <a:solidFill>
+                  <a:schemeClr val="tx1"/>
+                </a:solidFill>
+                <a:latin typeface="+mn-lt"/>
+                <a:ea typeface="+mn-ea"/>
+                <a:cs typeface="+mn-cs"/>
+              </a:defRPr>
+            </a:lvl4pPr>
+            <a:lvl5pPr marL="1828800" algn="l" defTabSz="914400" rtl="0" eaLnBrk="1" latinLnBrk="0" hangingPunct="1">
+              <a:defRPr sz="1800" kern="1200">
+                <a:solidFill>
+                  <a:schemeClr val="tx1"/>
+                </a:solidFill>
+                <a:latin typeface="+mn-lt"/>
+                <a:ea typeface="+mn-ea"/>
+                <a:cs typeface="+mn-cs"/>
+              </a:defRPr>
+            </a:lvl5pPr>
+            <a:lvl6pPr marL="2286000" algn="l" defTabSz="914400" rtl="0" eaLnBrk="1" latinLnBrk="0" hangingPunct="1">
+              <a:defRPr sz="1800" kern="1200">
+                <a:solidFill>
+                  <a:schemeClr val="tx1"/>
+                </a:solidFill>
+                <a:latin typeface="+mn-lt"/>
+                <a:ea typeface="+mn-ea"/>
+                <a:cs typeface="+mn-cs"/>
+              </a:defRPr>
+            </a:lvl6pPr>
+            <a:lvl7pPr marL="2743200" algn="l" defTabSz="914400" rtl="0" eaLnBrk="1" latinLnBrk="0" hangingPunct="1">
+              <a:defRPr sz="1800" kern="1200">
+                <a:solidFill>
+                  <a:schemeClr val="tx1"/>
+                </a:solidFill>
+                <a:latin typeface="+mn-lt"/>
+                <a:ea typeface="+mn-ea"/>
+                <a:cs typeface="+mn-cs"/>
+              </a:defRPr>
+            </a:lvl7pPr>
+            <a:lvl8pPr marL="3200400" algn="l" defTabSz="914400" rtl="0" eaLnBrk="1" latinLnBrk="0" hangingPunct="1">
+              <a:defRPr sz="1800" kern="1200">
+                <a:solidFill>
+                  <a:schemeClr val="tx1"/>
+                </a:solidFill>
+                <a:latin typeface="+mn-lt"/>
+                <a:ea typeface="+mn-ea"/>
+                <a:cs typeface="+mn-cs"/>
+              </a:defRPr>
+            </a:lvl8pPr>
+            <a:lvl9pPr marL="3657600" algn="l" defTabSz="914400" rtl="0" eaLnBrk="1" latinLnBrk="0" hangingPunct="1">
+              <a:defRPr sz="1800" kern="1200">
+                <a:solidFill>
+                  <a:schemeClr val="tx1"/>
+                </a:solidFill>
+                <a:latin typeface="+mn-lt"/>
+                <a:ea typeface="+mn-ea"/>
+                <a:cs typeface="+mn-cs"/>
+              </a:defRPr>
+            </a:lvl9pPr>
+          </a:lstStyle>
+          <a:p>
+            <a:r>
+              <a:rPr lang="en-US" sz="1200" dirty="0"/>
+              <a:t>Source: CNN, How marginalized communities in the South are paying the price for ‘green energy’ in Europe (</a:t>
+            </a:r>
+            <a:r>
+              <a:rPr lang="en-US" sz="1200" dirty="0">
+                <a:hlinkClick r:id="rId3"/>
+              </a:rPr>
+              <a:t>link</a:t>
+            </a:r>
+            <a:r>
+              <a:rPr lang="en-US" sz="1200" dirty="0"/>
+              <a:t>)  </a:t>
+            </a:r>
           </a:p>
         </p:txBody>
       </p:sp>
@@ -2714,33 +3086,247 @@
           <a:p>
             <a:r>
               <a:rPr lang="en-US" dirty="0"/>
-              <a:t>Background</a:t>
-            </a:r>
-          </a:p>
-        </p:txBody>
-      </p:sp>
-      <p:sp>
-        <p:nvSpPr>
-          <p:cNvPr id="3" name="Content Placeholder 2">
-            <a:extLst>
-              <a:ext uri="{FF2B5EF4-FFF2-40B4-BE49-F238E27FC236}">
-                <a16:creationId xmlns:a16="http://schemas.microsoft.com/office/drawing/2014/main" id="{D38A32B8-9115-9E6B-DE2F-3ECE4F32CB68}"/>
-              </a:ext>
-            </a:extLst>
-          </p:cNvPr>
-          <p:cNvSpPr>
-            <a:spLocks noGrp="1"/>
-          </p:cNvSpPr>
-          <p:nvPr>
-            <p:ph idx="1"/>
-          </p:nvPr>
-        </p:nvSpPr>
-        <p:spPr/>
-        <p:txBody>
-          <a:bodyPr/>
-          <a:lstStyle/>
-          <a:p>
-            <a:endParaRPr lang="en-US"/>
+              <a:t>Background (cont’d)</a:t>
+            </a:r>
+          </a:p>
+        </p:txBody>
+      </p:sp>
+      <p:sp>
+        <p:nvSpPr>
+          <p:cNvPr id="4" name="Content Placeholder 2">
+            <a:extLst>
+              <a:ext uri="{FF2B5EF4-FFF2-40B4-BE49-F238E27FC236}">
+                <a16:creationId xmlns:a16="http://schemas.microsoft.com/office/drawing/2014/main" id="{6B5AA0B3-E263-FFC8-26A8-4DB91EB12E70}"/>
+              </a:ext>
+            </a:extLst>
+          </p:cNvPr>
+          <p:cNvSpPr>
+            <a:spLocks noGrp="1"/>
+          </p:cNvSpPr>
+          <p:nvPr/>
+        </p:nvSpPr>
+        <p:spPr>
+          <a:xfrm>
+            <a:off x="1946031" y="1930339"/>
+            <a:ext cx="9598269" cy="4351338"/>
+          </a:xfrm>
+          <a:prstGeom prst="rect">
+            <a:avLst/>
+          </a:prstGeom>
+        </p:spPr>
+        <p:txBody>
+          <a:bodyPr vert="horz" lIns="91440" tIns="45720" rIns="91440" bIns="45720" rtlCol="0">
+            <a:normAutofit fontScale="85000" lnSpcReduction="10000"/>
+          </a:bodyPr>
+          <a:lstStyle>
+            <a:lvl1pPr marL="228600" indent="-228600" algn="l" defTabSz="914400" rtl="0" eaLnBrk="1" latinLnBrk="0" hangingPunct="1">
+              <a:lnSpc>
+                <a:spcPct val="90000"/>
+              </a:lnSpc>
+              <a:spcBef>
+                <a:spcPts val="1000"/>
+              </a:spcBef>
+              <a:buFont typeface="Arial" panose="020B0604020202020204" pitchFamily="34" charset="0"/>
+              <a:buChar char="•"/>
+              <a:defRPr sz="2800" kern="1200">
+                <a:solidFill>
+                  <a:schemeClr val="tx1"/>
+                </a:solidFill>
+                <a:latin typeface="+mn-lt"/>
+                <a:ea typeface="+mn-ea"/>
+                <a:cs typeface="+mn-cs"/>
+              </a:defRPr>
+            </a:lvl1pPr>
+            <a:lvl2pPr marL="685800" indent="-228600" algn="l" defTabSz="914400" rtl="0" eaLnBrk="1" latinLnBrk="0" hangingPunct="1">
+              <a:lnSpc>
+                <a:spcPct val="90000"/>
+              </a:lnSpc>
+              <a:spcBef>
+                <a:spcPts val="500"/>
+              </a:spcBef>
+              <a:buFont typeface="Arial" panose="020B0604020202020204" pitchFamily="34" charset="0"/>
+              <a:buChar char="•"/>
+              <a:defRPr sz="2400" kern="1200">
+                <a:solidFill>
+                  <a:schemeClr val="tx1"/>
+                </a:solidFill>
+                <a:latin typeface="+mn-lt"/>
+                <a:ea typeface="+mn-ea"/>
+                <a:cs typeface="+mn-cs"/>
+              </a:defRPr>
+            </a:lvl2pPr>
+            <a:lvl3pPr marL="1143000" indent="-228600" algn="l" defTabSz="914400" rtl="0" eaLnBrk="1" latinLnBrk="0" hangingPunct="1">
+              <a:lnSpc>
+                <a:spcPct val="90000"/>
+              </a:lnSpc>
+              <a:spcBef>
+                <a:spcPts val="500"/>
+              </a:spcBef>
+              <a:buFont typeface="Arial" panose="020B0604020202020204" pitchFamily="34" charset="0"/>
+              <a:buChar char="•"/>
+              <a:defRPr sz="2000" kern="1200">
+                <a:solidFill>
+                  <a:schemeClr val="tx1"/>
+                </a:solidFill>
+                <a:latin typeface="+mn-lt"/>
+                <a:ea typeface="+mn-ea"/>
+                <a:cs typeface="+mn-cs"/>
+              </a:defRPr>
+            </a:lvl3pPr>
+            <a:lvl4pPr marL="1600200" indent="-228600" algn="l" defTabSz="914400" rtl="0" eaLnBrk="1" latinLnBrk="0" hangingPunct="1">
+              <a:lnSpc>
+                <a:spcPct val="90000"/>
+              </a:lnSpc>
+              <a:spcBef>
+                <a:spcPts val="500"/>
+              </a:spcBef>
+              <a:buFont typeface="Arial" panose="020B0604020202020204" pitchFamily="34" charset="0"/>
+              <a:buChar char="•"/>
+              <a:defRPr sz="1800" kern="1200">
+                <a:solidFill>
+                  <a:schemeClr val="tx1"/>
+                </a:solidFill>
+                <a:latin typeface="+mn-lt"/>
+                <a:ea typeface="+mn-ea"/>
+                <a:cs typeface="+mn-cs"/>
+              </a:defRPr>
+            </a:lvl4pPr>
+            <a:lvl5pPr marL="2057400" indent="-228600" algn="l" defTabSz="914400" rtl="0" eaLnBrk="1" latinLnBrk="0" hangingPunct="1">
+              <a:lnSpc>
+                <a:spcPct val="90000"/>
+              </a:lnSpc>
+              <a:spcBef>
+                <a:spcPts val="500"/>
+              </a:spcBef>
+              <a:buFont typeface="Arial" panose="020B0604020202020204" pitchFamily="34" charset="0"/>
+              <a:buChar char="•"/>
+              <a:defRPr sz="1800" kern="1200">
+                <a:solidFill>
+                  <a:schemeClr val="tx1"/>
+                </a:solidFill>
+                <a:latin typeface="+mn-lt"/>
+                <a:ea typeface="+mn-ea"/>
+                <a:cs typeface="+mn-cs"/>
+              </a:defRPr>
+            </a:lvl5pPr>
+            <a:lvl6pPr marL="2514600" indent="-228600" algn="l" defTabSz="914400" rtl="0" eaLnBrk="1" latinLnBrk="0" hangingPunct="1">
+              <a:lnSpc>
+                <a:spcPct val="90000"/>
+              </a:lnSpc>
+              <a:spcBef>
+                <a:spcPts val="500"/>
+              </a:spcBef>
+              <a:buFont typeface="Arial" panose="020B0604020202020204" pitchFamily="34" charset="0"/>
+              <a:buChar char="•"/>
+              <a:defRPr sz="1800" kern="1200">
+                <a:solidFill>
+                  <a:schemeClr val="tx1"/>
+                </a:solidFill>
+                <a:latin typeface="+mn-lt"/>
+                <a:ea typeface="+mn-ea"/>
+                <a:cs typeface="+mn-cs"/>
+              </a:defRPr>
+            </a:lvl6pPr>
+            <a:lvl7pPr marL="2971800" indent="-228600" algn="l" defTabSz="914400" rtl="0" eaLnBrk="1" latinLnBrk="0" hangingPunct="1">
+              <a:lnSpc>
+                <a:spcPct val="90000"/>
+              </a:lnSpc>
+              <a:spcBef>
+                <a:spcPts val="500"/>
+              </a:spcBef>
+              <a:buFont typeface="Arial" panose="020B0604020202020204" pitchFamily="34" charset="0"/>
+              <a:buChar char="•"/>
+              <a:defRPr sz="1800" kern="1200">
+                <a:solidFill>
+                  <a:schemeClr val="tx1"/>
+                </a:solidFill>
+                <a:latin typeface="+mn-lt"/>
+                <a:ea typeface="+mn-ea"/>
+                <a:cs typeface="+mn-cs"/>
+              </a:defRPr>
+            </a:lvl7pPr>
+            <a:lvl8pPr marL="3429000" indent="-228600" algn="l" defTabSz="914400" rtl="0" eaLnBrk="1" latinLnBrk="0" hangingPunct="1">
+              <a:lnSpc>
+                <a:spcPct val="90000"/>
+              </a:lnSpc>
+              <a:spcBef>
+                <a:spcPts val="500"/>
+              </a:spcBef>
+              <a:buFont typeface="Arial" panose="020B0604020202020204" pitchFamily="34" charset="0"/>
+              <a:buChar char="•"/>
+              <a:defRPr sz="1800" kern="1200">
+                <a:solidFill>
+                  <a:schemeClr val="tx1"/>
+                </a:solidFill>
+                <a:latin typeface="+mn-lt"/>
+                <a:ea typeface="+mn-ea"/>
+                <a:cs typeface="+mn-cs"/>
+              </a:defRPr>
+            </a:lvl8pPr>
+            <a:lvl9pPr marL="3886200" indent="-228600" algn="l" defTabSz="914400" rtl="0" eaLnBrk="1" latinLnBrk="0" hangingPunct="1">
+              <a:lnSpc>
+                <a:spcPct val="90000"/>
+              </a:lnSpc>
+              <a:spcBef>
+                <a:spcPts val="500"/>
+              </a:spcBef>
+              <a:buFont typeface="Arial" panose="020B0604020202020204" pitchFamily="34" charset="0"/>
+              <a:buChar char="•"/>
+              <a:defRPr sz="1800" kern="1200">
+                <a:solidFill>
+                  <a:schemeClr val="tx1"/>
+                </a:solidFill>
+                <a:latin typeface="+mn-lt"/>
+                <a:ea typeface="+mn-ea"/>
+                <a:cs typeface="+mn-cs"/>
+              </a:defRPr>
+            </a:lvl9pPr>
+          </a:lstStyle>
+          <a:p>
+            <a:r>
+              <a:rPr lang="en-US" dirty="0"/>
+              <a:t>These meetings happened as CCD was developing technical capabilities in EJ analytics</a:t>
+            </a:r>
+          </a:p>
+          <a:p>
+            <a:r>
+              <a:rPr lang="en-US" dirty="0"/>
+              <a:t>Initial meetings with Dr. Greg Latta, developer of the LURA model, revealed that he shared our interest.  He shared a spreadsheet with all the forest product mills (all types), their locations, and demographics from the Census block group where they were located.</a:t>
+            </a:r>
+          </a:p>
+          <a:p>
+            <a:r>
+              <a:rPr lang="en-US" dirty="0"/>
+              <a:t>Our work builds on </a:t>
+            </a:r>
+            <a:r>
+              <a:rPr lang="en-US" dirty="0" err="1"/>
+              <a:t>Latta’s</a:t>
+            </a:r>
+            <a:r>
+              <a:rPr lang="en-US" dirty="0"/>
+              <a:t> by including additional datasets describing health conditions, and other nearby emitters at multiple scales.</a:t>
+            </a:r>
+          </a:p>
+          <a:p>
+            <a:r>
+              <a:rPr lang="en-US" dirty="0"/>
+              <a:t>Our analysis is a work-in-progress</a:t>
+            </a:r>
+          </a:p>
+          <a:p>
+            <a:r>
+              <a:rPr lang="en-US" dirty="0"/>
+              <a:t>CCD has been working with Tom Casey, a UMD master’s student on his capstone project “Community assessments of pulp and paper mills in Georgia”.  We are scheduling a brownbag for Tom on May 21</a:t>
+            </a:r>
+            <a:r>
+              <a:rPr lang="en-US" baseline="30000" dirty="0"/>
+              <a:t>st</a:t>
+            </a:r>
+            <a:endParaRPr lang="en-US" dirty="0"/>
+          </a:p>
+          <a:p>
+            <a:endParaRPr lang="en-US" dirty="0"/>
           </a:p>
         </p:txBody>
       </p:sp>
@@ -2797,7 +3383,7 @@
           <a:p>
             <a:r>
               <a:rPr lang="en-US" dirty="0"/>
-              <a:t>Background</a:t>
+              <a:t>Automated Proximity Analysis</a:t>
             </a:r>
           </a:p>
         </p:txBody>
@@ -2818,15 +3404,106 @@
             <p:ph idx="1"/>
           </p:nvPr>
         </p:nvSpPr>
-        <p:spPr/>
-        <p:txBody>
-          <a:bodyPr/>
-          <a:lstStyle/>
-          <a:p>
-            <a:endParaRPr lang="en-US"/>
-          </a:p>
-        </p:txBody>
-      </p:sp>
+        <p:spPr>
+          <a:xfrm>
+            <a:off x="1922226" y="2141537"/>
+            <a:ext cx="9431573" cy="4351338"/>
+          </a:xfrm>
+        </p:spPr>
+        <p:txBody>
+          <a:bodyPr>
+            <a:normAutofit/>
+          </a:bodyPr>
+          <a:lstStyle/>
+          <a:p>
+            <a:pPr marL="0" indent="0">
+              <a:buNone/>
+            </a:pPr>
+            <a:r>
+              <a:rPr lang="en-US" sz="2400" dirty="0"/>
+              <a:t>1. Input facility locations</a:t>
+            </a:r>
+          </a:p>
+          <a:p>
+            <a:pPr marL="0" indent="0">
+              <a:buNone/>
+            </a:pPr>
+            <a:r>
+              <a:rPr lang="en-US" sz="2400" dirty="0"/>
+              <a:t>2. Identify radii around facilities</a:t>
+            </a:r>
+          </a:p>
+          <a:p>
+            <a:pPr marL="0" indent="0">
+              <a:buNone/>
+            </a:pPr>
+            <a:r>
+              <a:rPr lang="en-US" sz="2400" dirty="0"/>
+              <a:t>3. Map census tracts to radii</a:t>
+            </a:r>
+          </a:p>
+          <a:p>
+            <a:pPr marL="0" indent="0">
+              <a:buNone/>
+            </a:pPr>
+            <a:r>
+              <a:rPr lang="en-US" sz="2400" dirty="0"/>
+              <a:t>4. Aggregate variable values</a:t>
+            </a:r>
+          </a:p>
+          <a:p>
+            <a:pPr marL="0" indent="0">
+              <a:buNone/>
+            </a:pPr>
+            <a:r>
+              <a:rPr lang="en-US" sz="2400" dirty="0"/>
+              <a:t>5. Output summary table</a:t>
+            </a:r>
+          </a:p>
+          <a:p>
+            <a:endParaRPr lang="en-US" sz="2400" dirty="0"/>
+          </a:p>
+          <a:p>
+            <a:endParaRPr lang="en-US" sz="2400" dirty="0"/>
+          </a:p>
+          <a:p>
+            <a:endParaRPr lang="en-US" sz="2400" dirty="0"/>
+          </a:p>
+          <a:p>
+            <a:endParaRPr lang="en-US" sz="2400" dirty="0"/>
+          </a:p>
+        </p:txBody>
+      </p:sp>
+      <p:pic>
+        <p:nvPicPr>
+          <p:cNvPr id="5" name="Picture 4">
+            <a:extLst>
+              <a:ext uri="{FF2B5EF4-FFF2-40B4-BE49-F238E27FC236}">
+                <a16:creationId xmlns:a16="http://schemas.microsoft.com/office/drawing/2014/main" id="{2C645F10-138F-9687-8C65-DF5D37DD0E8C}"/>
+              </a:ext>
+            </a:extLst>
+          </p:cNvPr>
+          <p:cNvPicPr>
+            <a:picLocks noChangeAspect="1"/>
+          </p:cNvPicPr>
+          <p:nvPr/>
+        </p:nvPicPr>
+        <p:blipFill>
+          <a:blip r:embed="rId2"/>
+          <a:stretch>
+            <a:fillRect/>
+          </a:stretch>
+        </p:blipFill>
+        <p:spPr>
+          <a:xfrm>
+            <a:off x="6347028" y="1927657"/>
+            <a:ext cx="5006771" cy="3002685"/>
+          </a:xfrm>
+          <a:prstGeom prst="rect">
+            <a:avLst/>
+          </a:prstGeom>
+        </p:spPr>
+      </p:pic>
     </p:spTree>
     <p:extLst>
       <p:ext uri="{BB962C8B-B14F-4D97-AF65-F5344CB8AC3E}">
@@ -2880,7 +3557,7 @@
           <a:p>
             <a:r>
               <a:rPr lang="en-US" dirty="0"/>
-              <a:t>Background</a:t>
+              <a:t>Data Sources</a:t>
             </a:r>
           </a:p>
         </p:txBody>
@@ -2901,12 +3578,108 @@
             <p:ph idx="1"/>
           </p:nvPr>
         </p:nvSpPr>
-        <p:spPr/>
-        <p:txBody>
-          <a:bodyPr/>
-          <a:lstStyle/>
-          <a:p>
-            <a:endParaRPr lang="en-US"/>
+        <p:spPr>
+          <a:xfrm>
+            <a:off x="1922226" y="1436158"/>
+            <a:ext cx="9431573" cy="4351338"/>
+          </a:xfrm>
+        </p:spPr>
+        <p:txBody>
+          <a:bodyPr>
+            <a:normAutofit fontScale="92500" lnSpcReduction="20000"/>
+          </a:bodyPr>
+          <a:lstStyle/>
+          <a:p>
+            <a:pPr lvl="1"/>
+            <a:r>
+              <a:rPr lang="en-US" dirty="0"/>
+              <a:t>American Community Survey 2019 (ACS)*</a:t>
+            </a:r>
+          </a:p>
+          <a:p>
+            <a:pPr lvl="2"/>
+            <a:r>
+              <a:rPr lang="en-US" sz="2400" dirty="0"/>
+              <a:t>Race and ethnicity demographics</a:t>
+            </a:r>
+          </a:p>
+          <a:p>
+            <a:pPr lvl="2"/>
+            <a:r>
+              <a:rPr lang="en-US" sz="2400" dirty="0"/>
+              <a:t>Median household income</a:t>
+            </a:r>
+          </a:p>
+          <a:p>
+            <a:pPr lvl="1"/>
+            <a:r>
+              <a:rPr lang="en-US" dirty="0" err="1"/>
+              <a:t>AirToxScreen</a:t>
+            </a:r>
+            <a:r>
+              <a:rPr lang="en-US" dirty="0"/>
+              <a:t> 2019</a:t>
+            </a:r>
+          </a:p>
+          <a:p>
+            <a:pPr lvl="2"/>
+            <a:r>
+              <a:rPr lang="en-US" sz="2400" dirty="0"/>
+              <a:t>Cancer risk</a:t>
+            </a:r>
+          </a:p>
+          <a:p>
+            <a:pPr lvl="2"/>
+            <a:r>
+              <a:rPr lang="en-US" sz="2400" dirty="0"/>
+              <a:t>Respiratory illness risk</a:t>
+            </a:r>
+          </a:p>
+          <a:p>
+            <a:pPr lvl="1"/>
+            <a:r>
+              <a:rPr lang="en-US" dirty="0"/>
+              <a:t>CDC PLACES, 2021 release*</a:t>
+            </a:r>
+          </a:p>
+          <a:p>
+            <a:pPr lvl="2"/>
+            <a:r>
+              <a:rPr lang="en-US" sz="2400" dirty="0"/>
+              <a:t>Asthma</a:t>
+            </a:r>
+          </a:p>
+          <a:p>
+            <a:pPr lvl="2"/>
+            <a:r>
+              <a:rPr lang="en-US" sz="2400" dirty="0"/>
+              <a:t>Heart disease</a:t>
+            </a:r>
+          </a:p>
+          <a:p>
+            <a:pPr lvl="2"/>
+            <a:r>
+              <a:rPr lang="en-US" sz="2400" dirty="0"/>
+              <a:t>Access to health insurance</a:t>
+            </a:r>
+          </a:p>
+          <a:p>
+            <a:pPr lvl="2"/>
+            <a:endParaRPr lang="en-US" sz="2400" dirty="0"/>
+          </a:p>
+          <a:p>
+            <a:pPr lvl="1"/>
+            <a:r>
+              <a:rPr lang="en-US" sz="2800" dirty="0"/>
+              <a:t>All surveys utilize 2010 census tract boundaries</a:t>
+            </a:r>
+          </a:p>
+          <a:p>
+            <a:pPr lvl="2"/>
+            <a:r>
+              <a:rPr lang="en-US" sz="2400" dirty="0"/>
+              <a:t>*: More recent versions available</a:t>
+            </a:r>
           </a:p>
         </p:txBody>
       </p:sp>
@@ -2963,7 +3736,7 @@
           <a:p>
             <a:r>
               <a:rPr lang="en-US" dirty="0"/>
-              <a:t>Background</a:t>
+              <a:t>Summary Analysis Tables</a:t>
             </a:r>
           </a:p>
         </p:txBody>
@@ -3023,10 +3796,63 @@
           <a:chExt cx="0" cy="0"/>
         </a:xfrm>
       </p:grpSpPr>
+      <p:sp>
+        <p:nvSpPr>
+          <p:cNvPr id="2" name="Title 1">
+            <a:extLst>
+              <a:ext uri="{FF2B5EF4-FFF2-40B4-BE49-F238E27FC236}">
+                <a16:creationId xmlns:a16="http://schemas.microsoft.com/office/drawing/2014/main" id="{41AEFC33-D9F3-BE47-997E-BD131A1AC8BE}"/>
+              </a:ext>
+            </a:extLst>
+          </p:cNvPr>
+          <p:cNvSpPr>
+            <a:spLocks noGrp="1"/>
+          </p:cNvSpPr>
+          <p:nvPr>
+            <p:ph type="title"/>
+          </p:nvPr>
+        </p:nvSpPr>
+        <p:spPr/>
+        <p:txBody>
+          <a:bodyPr/>
+          <a:lstStyle/>
+          <a:p>
+            <a:r>
+              <a:rPr lang="en-US" dirty="0"/>
+              <a:t>Next Steps</a:t>
+            </a:r>
+          </a:p>
+        </p:txBody>
+      </p:sp>
+      <p:sp>
+        <p:nvSpPr>
+          <p:cNvPr id="3" name="Content Placeholder 2">
+            <a:extLst>
+              <a:ext uri="{FF2B5EF4-FFF2-40B4-BE49-F238E27FC236}">
+                <a16:creationId xmlns:a16="http://schemas.microsoft.com/office/drawing/2014/main" id="{D38A32B8-9115-9E6B-DE2F-3ECE4F32CB68}"/>
+              </a:ext>
+            </a:extLst>
+          </p:cNvPr>
+          <p:cNvSpPr>
+            <a:spLocks noGrp="1"/>
+          </p:cNvSpPr>
+          <p:nvPr>
+            <p:ph idx="1"/>
+          </p:nvPr>
+        </p:nvSpPr>
+        <p:spPr/>
+        <p:txBody>
+          <a:bodyPr/>
+          <a:lstStyle/>
+          <a:p>
+            <a:endParaRPr lang="en-US"/>
+          </a:p>
+        </p:txBody>
+      </p:sp>
     </p:spTree>
     <p:extLst>
       <p:ext uri="{BB962C8B-B14F-4D97-AF65-F5344CB8AC3E}">
-        <p14:creationId xmlns:p14="http://schemas.microsoft.com/office/powerpoint/2010/main" val="1702650984"/>
+        <p14:creationId xmlns:p14="http://schemas.microsoft.com/office/powerpoint/2010/main" val="735056363"/>
       </p:ext>
     </p:extLst>
   </p:cSld>

</xml_diff>